<commit_message>
Added expernses and finished presentation
</commit_message>
<xml_diff>
--- a/poster/poster.pptx
+++ b/poster/poster.pptx
@@ -212,7 +212,7 @@
             <a:fld id="{792EE934-69F3-5941-ADF8-9A478A38E988}" type="datetimeFigureOut">
               <a:rPr lang="en-GB"/>
               <a:pPr/>
-              <a:t>19/04/2023</a:t>
+              <a:t>28/08/2023</a:t>
             </a:fld>
             <a:endParaRPr lang="en-US"/>
           </a:p>
@@ -379,7 +379,7 @@
             <a:fld id="{C054A823-6FA9-3743-9310-B3C829E3CFA1}" type="datetimeFigureOut">
               <a:rPr lang="en-GB"/>
               <a:pPr/>
-              <a:t>19/04/2023</a:t>
+              <a:t>28/08/2023</a:t>
             </a:fld>
             <a:endParaRPr lang="en-US"/>
           </a:p>
@@ -1210,7 +1210,23 @@
                   <a:srgbClr val="373A3A"/>
                 </a:solidFill>
               </a:rPr>
-              <a:t>Name of Authors</a:t>
+              <a:t>Doug Salt</a:t>
+            </a:r>
+            <a:r>
+              <a:rPr lang="en-US" sz="2800" baseline="30000" dirty="0">
+                <a:solidFill>
+                  <a:srgbClr val="373A3A"/>
+                </a:solidFill>
+              </a:rPr>
+              <a:t>1</a:t>
+            </a:r>
+            <a:r>
+              <a:rPr lang="en-US" sz="2800" dirty="0">
+                <a:solidFill>
+                  <a:srgbClr val="373A3A"/>
+                </a:solidFill>
+              </a:rPr>
+              <a:t> and Gary Polhill</a:t>
             </a:r>
             <a:r>
               <a:rPr lang="en-US" sz="2800" baseline="30000" dirty="0">
@@ -1259,41 +1275,8 @@
                 </a:solidFill>
                 <a:latin typeface="Calibri"/>
               </a:rPr>
-              <a:t>Email: </a:t>
-            </a:r>
-            <a:r>
-              <a:rPr lang="en-US" sz="2000" err="1">
-                <a:solidFill>
-                  <a:srgbClr val="373A3A"/>
-                </a:solidFill>
-                <a:latin typeface="Calibri"/>
-              </a:rPr>
-              <a:t>doug</a:t>
-            </a:r>
-            <a:r>
-              <a:rPr lang="en-US" sz="2000">
-                <a:solidFill>
-                  <a:srgbClr val="373A3A"/>
-                </a:solidFill>
-                <a:latin typeface="Calibri"/>
-              </a:rPr>
-              <a:t>.salt@</a:t>
-            </a:r>
-            <a:r>
-              <a:rPr lang="en-US" sz="2000" dirty="0" err="1">
-                <a:solidFill>
-                  <a:srgbClr val="373A3A"/>
-                </a:solidFill>
-                <a:latin typeface="Calibri"/>
-              </a:rPr>
-              <a:t>hutton.ac.uk</a:t>
-            </a:r>
-            <a:endParaRPr lang="en-US" sz="2000" dirty="0">
-              <a:solidFill>
-                <a:srgbClr val="373A3A"/>
-              </a:solidFill>
-              <a:latin typeface="Calibri"/>
-            </a:endParaRPr>
+              <a:t>Email: doug.salt@hutton.ac.uk</a:t>
+            </a:r>
           </a:p>
           <a:p>
             <a:endParaRPr lang="en-US" dirty="0">
@@ -1409,7 +1392,7 @@
                 </a:solidFill>
                 <a:latin typeface="Calibri"/>
               </a:rPr>
-              <a:t> Four new </a:t>
+              <a:t>Four new </a:t>
             </a:r>
             <a:r>
               <a:rPr lang="en-US" sz="3400" dirty="0" err="1">
@@ -1427,7 +1410,7 @@
                 </a:solidFill>
                 <a:latin typeface="Calibri"/>
               </a:rPr>
-              <a:t> extension</a:t>
+              <a:t> extensions</a:t>
             </a:r>
           </a:p>
           <a:p>
@@ -1445,25 +1428,7 @@
                 </a:solidFill>
                 <a:latin typeface="Calibri"/>
               </a:rPr>
-              <a:t>Represents The James Hutton’s Institute continued development of </a:t>
-            </a:r>
-            <a:r>
-              <a:rPr lang="en-US" sz="3400" dirty="0" err="1">
-                <a:solidFill>
-                  <a:schemeClr val="bg1"/>
-                </a:solidFill>
-                <a:latin typeface="Calibri"/>
-              </a:rPr>
-              <a:t>NetLogo</a:t>
-            </a:r>
-            <a:r>
-              <a:rPr lang="en-US" sz="3400" dirty="0">
-                <a:solidFill>
-                  <a:schemeClr val="bg1"/>
-                </a:solidFill>
-                <a:latin typeface="Calibri"/>
-              </a:rPr>
-              <a:t> as a “serious” tool for modelling.</a:t>
+              <a:t>Represents The James Hutton’s Institute continued development of NetLogo as a “serious” tool for modelling.</a:t>
             </a:r>
           </a:p>
           <a:p>
@@ -1481,7 +1446,7 @@
                 </a:solidFill>
                 <a:latin typeface="Calibri"/>
               </a:rPr>
-              <a:t>Something else</a:t>
+              <a:t>Toolset development (often underfunded or ignored) </a:t>
             </a:r>
           </a:p>
           <a:p>
@@ -1499,7 +1464,45 @@
                 </a:solidFill>
                 <a:latin typeface="Calibri"/>
               </a:rPr>
-              <a:t>Another thing</a:t>
+              <a:t>Theory implementation in the </a:t>
+            </a:r>
+            <a:r>
+              <a:rPr lang="en-US" sz="3400" dirty="0" err="1">
+                <a:solidFill>
+                  <a:srgbClr val="00B0F0"/>
+                </a:solidFill>
+                <a:latin typeface="Courier New" panose="02070309020205020404" pitchFamily="49" charset="0"/>
+                <a:cs typeface="Courier New" panose="02070309020205020404" pitchFamily="49" charset="0"/>
+              </a:rPr>
+              <a:t>cbr</a:t>
+            </a:r>
+            <a:r>
+              <a:rPr lang="en-US" sz="3400" dirty="0">
+                <a:solidFill>
+                  <a:schemeClr val="bg1"/>
+                </a:solidFill>
+                <a:latin typeface="Calibri"/>
+              </a:rPr>
+              <a:t> and </a:t>
+            </a:r>
+            <a:r>
+              <a:rPr lang="en-US" sz="3400" dirty="0" err="1">
+                <a:solidFill>
+                  <a:srgbClr val="00B0F0"/>
+                </a:solidFill>
+                <a:latin typeface="Courier New" panose="02070309020205020404" pitchFamily="49" charset="0"/>
+                <a:cs typeface="Courier New" panose="02070309020205020404" pitchFamily="49" charset="0"/>
+              </a:rPr>
+              <a:t>lkt</a:t>
+            </a:r>
+            <a:r>
+              <a:rPr lang="en-US" sz="3400" dirty="0">
+                <a:solidFill>
+                  <a:schemeClr val="bg1"/>
+                </a:solidFill>
+                <a:latin typeface="Calibri"/>
+              </a:rPr>
+              <a:t> extensions</a:t>
             </a:r>
           </a:p>
           <a:p>
@@ -1517,32 +1520,46 @@
                 </a:solidFill>
                 <a:latin typeface="Calibri"/>
               </a:rPr>
-              <a:t>And this, of course. Why do muggles put up with the shite that is </a:t>
+              <a:t>Pragmatic implementations in the </a:t>
+            </a:r>
+            <a:r>
+              <a:rPr lang="en-US" sz="3400" dirty="0">
+                <a:solidFill>
+                  <a:srgbClr val="00B0F0"/>
+                </a:solidFill>
+                <a:latin typeface="Courier New" panose="02070309020205020404" pitchFamily="49" charset="0"/>
+                <a:cs typeface="Courier New" panose="02070309020205020404" pitchFamily="49" charset="0"/>
+              </a:rPr>
+              <a:t>math</a:t>
+            </a:r>
+            <a:r>
+              <a:rPr lang="en-US" sz="3400" dirty="0">
+                <a:solidFill>
+                  <a:schemeClr val="bg1"/>
+                </a:solidFill>
+                <a:latin typeface="Calibri"/>
+              </a:rPr>
+              <a:t> and </a:t>
             </a:r>
             <a:r>
               <a:rPr lang="en-US" sz="3400" dirty="0" err="1">
                 <a:solidFill>
+                  <a:srgbClr val="00B0F0"/>
+                </a:solidFill>
+                <a:latin typeface="Courier New" panose="02070309020205020404" pitchFamily="49" charset="0"/>
+                <a:cs typeface="Courier New" panose="02070309020205020404" pitchFamily="49" charset="0"/>
+              </a:rPr>
+              <a:t>mgr</a:t>
+            </a:r>
+            <a:r>
+              <a:rPr lang="en-US" sz="3400" dirty="0">
+                <a:solidFill>
                   <a:schemeClr val="bg1"/>
                 </a:solidFill>
                 <a:latin typeface="Calibri"/>
               </a:rPr>
-              <a:t>powerpoint</a:t>
-            </a:r>
-            <a:r>
-              <a:rPr lang="en-US" sz="3400">
-                <a:solidFill>
-                  <a:schemeClr val="bg1"/>
-                </a:solidFill>
-                <a:latin typeface="Calibri"/>
-              </a:rPr>
-              <a:t>.</a:t>
-            </a:r>
-            <a:endParaRPr lang="en-US" sz="3400" dirty="0">
-              <a:solidFill>
-                <a:schemeClr val="bg1"/>
-              </a:solidFill>
-              <a:latin typeface="Calibri"/>
-            </a:endParaRPr>
+              <a:t> extensions</a:t>
+            </a:r>
           </a:p>
         </p:txBody>
       </p:sp>
@@ -7761,6 +7778,83 @@
 </file>
 
 <file path=customXml/item1.xml><?xml version="1.0" encoding="utf-8"?>
+<p:properties xmlns:p="http://schemas.microsoft.com/office/2006/metadata/properties" xmlns:xsi="http://www.w3.org/2001/XMLSchema-instance" xmlns:pc="http://schemas.microsoft.com/office/infopath/2007/PartnerControls">
+  <documentManagement>
+    <TaxKeywordTaxHTField xmlns="dd4118c1-80c0-4fd0-a895-4f8cc7b15db9">
+      <Terms xmlns="http://schemas.microsoft.com/office/infopath/2007/PartnerControls"/>
+    </TaxKeywordTaxHTField>
+    <TaxCatchAll xmlns="dd4118c1-80c0-4fd0-a895-4f8cc7b15db9"/>
+    <PublishingExpirationDate xmlns="http://schemas.microsoft.com/sharepoint/v3" xsi:nil="true"/>
+    <PublishingStartDate xmlns="http://schemas.microsoft.com/sharepoint/v3" xsi:nil="true"/>
+    <_dlc_DocId xmlns="dd4118c1-80c0-4fd0-a895-4f8cc7b15db9">6X5HV3WVA3CC-138-179</_dlc_DocId>
+    <_dlc_DocIdUrl xmlns="dd4118c1-80c0-4fd0-a895-4f8cc7b15db9">
+      <Url>http://connect.hutton.ac.uk/Organisation/Comms/_layouts/15/DocIdRedir.aspx?ID=6X5HV3WVA3CC-138-179</Url>
+      <Description>6X5HV3WVA3CC-138-179</Description>
+    </_dlc_DocIdUrl>
+  </documentManagement>
+</p:properties>
+</file>
+
+<file path=customXml/item2.xml><?xml version="1.0" encoding="utf-8"?>
+<?mso-contentType ?>
+<FormTemplates xmlns="http://schemas.microsoft.com/sharepoint/v3/contenttype/forms">
+  <Display>DocumentLibraryForm</Display>
+  <Edit>DocumentLibraryForm</Edit>
+  <New>DocumentLibraryForm</New>
+</FormTemplates>
+</file>
+
+<file path=customXml/item3.xml><?xml version="1.0" encoding="utf-8"?>
+<?mso-contentType ?>
+<spe:Receivers xmlns:spe="http://schemas.microsoft.com/sharepoint/events">
+  <Receiver>
+    <Name>Document ID Generator</Name>
+    <Synchronization>Synchronous</Synchronization>
+    <Type>10001</Type>
+    <SequenceNumber>1000</SequenceNumber>
+    <Url/>
+    <Assembly>Microsoft.Office.DocumentManagement, Version=15.0.0.0, Culture=neutral, PublicKeyToken=71e9bce111e9429c</Assembly>
+    <Class>Microsoft.Office.DocumentManagement.Internal.DocIdHandler</Class>
+    <Data/>
+    <Filter/>
+  </Receiver>
+  <Receiver>
+    <Name>Document ID Generator</Name>
+    <Synchronization>Synchronous</Synchronization>
+    <Type>10002</Type>
+    <SequenceNumber>1001</SequenceNumber>
+    <Url/>
+    <Assembly>Microsoft.Office.DocumentManagement, Version=15.0.0.0, Culture=neutral, PublicKeyToken=71e9bce111e9429c</Assembly>
+    <Class>Microsoft.Office.DocumentManagement.Internal.DocIdHandler</Class>
+    <Data/>
+    <Filter/>
+  </Receiver>
+  <Receiver>
+    <Name>Document ID Generator</Name>
+    <Synchronization>Synchronous</Synchronization>
+    <Type>10004</Type>
+    <SequenceNumber>1002</SequenceNumber>
+    <Url/>
+    <Assembly>Microsoft.Office.DocumentManagement, Version=15.0.0.0, Culture=neutral, PublicKeyToken=71e9bce111e9429c</Assembly>
+    <Class>Microsoft.Office.DocumentManagement.Internal.DocIdHandler</Class>
+    <Data/>
+    <Filter/>
+  </Receiver>
+  <Receiver>
+    <Name>Document ID Generator</Name>
+    <Synchronization>Synchronous</Synchronization>
+    <Type>10006</Type>
+    <SequenceNumber>1003</SequenceNumber>
+    <Url/>
+    <Assembly>Microsoft.Office.DocumentManagement, Version=15.0.0.0, Culture=neutral, PublicKeyToken=71e9bce111e9429c</Assembly>
+    <Class>Microsoft.Office.DocumentManagement.Internal.DocIdHandler</Class>
+    <Data/>
+    <Filter/>
+  </Receiver>
+</spe:Receivers>
+</file>
+
+<file path=customXml/item4.xml><?xml version="1.0" encoding="utf-8"?>
 <ct:contentTypeSchema xmlns:ct="http://schemas.microsoft.com/office/2006/metadata/contentType" xmlns:ma="http://schemas.microsoft.com/office/2006/metadata/properties/metaAttributes" ct:_="" ma:_="" ma:contentTypeName="Document" ma:contentTypeID="0x0101008362D038233C51469147F003D8E0F8C5" ma:contentTypeVersion="2" ma:contentTypeDescription="Create a new document." ma:contentTypeScope="" ma:versionID="460adbf0d06597c5193aeeffe506f3a5">
   <xsd:schema xmlns:xsd="http://www.w3.org/2001/XMLSchema" xmlns:xs="http://www.w3.org/2001/XMLSchema" xmlns:p="http://schemas.microsoft.com/office/2006/metadata/properties" xmlns:ns1="http://schemas.microsoft.com/sharepoint/v3" xmlns:ns2="dd4118c1-80c0-4fd0-a895-4f8cc7b15db9" targetNamespace="http://schemas.microsoft.com/office/2006/metadata/properties" ma:root="true" ma:fieldsID="7fdb9e80014ce22284f30f74730fcf76" ns1:_="" ns2:_="">
     <xsd:import namespace="http://schemas.microsoft.com/sharepoint/v3"/>
@@ -7954,84 +8048,34 @@
 </ct:contentTypeSchema>
 </file>
 
-<file path=customXml/item2.xml><?xml version="1.0" encoding="utf-8"?>
-<?mso-contentType ?>
-<spe:Receivers xmlns:spe="http://schemas.microsoft.com/sharepoint/events">
-  <Receiver>
-    <Name>Document ID Generator</Name>
-    <Synchronization>Synchronous</Synchronization>
-    <Type>10001</Type>
-    <SequenceNumber>1000</SequenceNumber>
-    <Url/>
-    <Assembly>Microsoft.Office.DocumentManagement, Version=15.0.0.0, Culture=neutral, PublicKeyToken=71e9bce111e9429c</Assembly>
-    <Class>Microsoft.Office.DocumentManagement.Internal.DocIdHandler</Class>
-    <Data/>
-    <Filter/>
-  </Receiver>
-  <Receiver>
-    <Name>Document ID Generator</Name>
-    <Synchronization>Synchronous</Synchronization>
-    <Type>10002</Type>
-    <SequenceNumber>1001</SequenceNumber>
-    <Url/>
-    <Assembly>Microsoft.Office.DocumentManagement, Version=15.0.0.0, Culture=neutral, PublicKeyToken=71e9bce111e9429c</Assembly>
-    <Class>Microsoft.Office.DocumentManagement.Internal.DocIdHandler</Class>
-    <Data/>
-    <Filter/>
-  </Receiver>
-  <Receiver>
-    <Name>Document ID Generator</Name>
-    <Synchronization>Synchronous</Synchronization>
-    <Type>10004</Type>
-    <SequenceNumber>1002</SequenceNumber>
-    <Url/>
-    <Assembly>Microsoft.Office.DocumentManagement, Version=15.0.0.0, Culture=neutral, PublicKeyToken=71e9bce111e9429c</Assembly>
-    <Class>Microsoft.Office.DocumentManagement.Internal.DocIdHandler</Class>
-    <Data/>
-    <Filter/>
-  </Receiver>
-  <Receiver>
-    <Name>Document ID Generator</Name>
-    <Synchronization>Synchronous</Synchronization>
-    <Type>10006</Type>
-    <SequenceNumber>1003</SequenceNumber>
-    <Url/>
-    <Assembly>Microsoft.Office.DocumentManagement, Version=15.0.0.0, Culture=neutral, PublicKeyToken=71e9bce111e9429c</Assembly>
-    <Class>Microsoft.Office.DocumentManagement.Internal.DocIdHandler</Class>
-    <Data/>
-    <Filter/>
-  </Receiver>
-</spe:Receivers>
+<file path=customXml/itemProps1.xml><?xml version="1.0" encoding="utf-8"?>
+<ds:datastoreItem xmlns:ds="http://schemas.openxmlformats.org/officeDocument/2006/customXml" ds:itemID="{2D260B71-EADC-4271-AC86-2F194793104C}">
+  <ds:schemaRefs>
+    <ds:schemaRef ds:uri="http://schemas.microsoft.com/office/2006/metadata/properties"/>
+    <ds:schemaRef ds:uri="http://schemas.microsoft.com/office/infopath/2007/PartnerControls"/>
+    <ds:schemaRef ds:uri="dd4118c1-80c0-4fd0-a895-4f8cc7b15db9"/>
+    <ds:schemaRef ds:uri="http://schemas.microsoft.com/sharepoint/v3"/>
+  </ds:schemaRefs>
+</ds:datastoreItem>
 </file>
 
-<file path=customXml/item3.xml><?xml version="1.0" encoding="utf-8"?>
-<?mso-contentType ?>
-<FormTemplates xmlns="http://schemas.microsoft.com/sharepoint/v3/contenttype/forms">
-  <Display>DocumentLibraryForm</Display>
-  <Edit>DocumentLibraryForm</Edit>
-  <New>DocumentLibraryForm</New>
-</FormTemplates>
+<file path=customXml/itemProps2.xml><?xml version="1.0" encoding="utf-8"?>
+<ds:datastoreItem xmlns:ds="http://schemas.openxmlformats.org/officeDocument/2006/customXml" ds:itemID="{5D34737E-61E8-4035-A868-C618842E7CF9}">
+  <ds:schemaRefs>
+    <ds:schemaRef ds:uri="http://schemas.microsoft.com/sharepoint/v3/contenttype/forms"/>
+  </ds:schemaRefs>
+</ds:datastoreItem>
 </file>
 
-<file path=customXml/item4.xml><?xml version="1.0" encoding="utf-8"?>
-<p:properties xmlns:p="http://schemas.microsoft.com/office/2006/metadata/properties" xmlns:xsi="http://www.w3.org/2001/XMLSchema-instance" xmlns:pc="http://schemas.microsoft.com/office/infopath/2007/PartnerControls">
-  <documentManagement>
-    <TaxKeywordTaxHTField xmlns="dd4118c1-80c0-4fd0-a895-4f8cc7b15db9">
-      <Terms xmlns="http://schemas.microsoft.com/office/infopath/2007/PartnerControls"/>
-    </TaxKeywordTaxHTField>
-    <TaxCatchAll xmlns="dd4118c1-80c0-4fd0-a895-4f8cc7b15db9"/>
-    <PublishingExpirationDate xmlns="http://schemas.microsoft.com/sharepoint/v3" xsi:nil="true"/>
-    <PublishingStartDate xmlns="http://schemas.microsoft.com/sharepoint/v3" xsi:nil="true"/>
-    <_dlc_DocId xmlns="dd4118c1-80c0-4fd0-a895-4f8cc7b15db9">6X5HV3WVA3CC-138-179</_dlc_DocId>
-    <_dlc_DocIdUrl xmlns="dd4118c1-80c0-4fd0-a895-4f8cc7b15db9">
-      <Url>http://connect.hutton.ac.uk/Organisation/Comms/_layouts/15/DocIdRedir.aspx?ID=6X5HV3WVA3CC-138-179</Url>
-      <Description>6X5HV3WVA3CC-138-179</Description>
-    </_dlc_DocIdUrl>
-  </documentManagement>
-</p:properties>
+<file path=customXml/itemProps3.xml><?xml version="1.0" encoding="utf-8"?>
+<ds:datastoreItem xmlns:ds="http://schemas.openxmlformats.org/officeDocument/2006/customXml" ds:itemID="{CC08FE15-FD71-4071-8E0F-8BE34A00D6BD}">
+  <ds:schemaRefs>
+    <ds:schemaRef ds:uri="http://schemas.microsoft.com/sharepoint/events"/>
+  </ds:schemaRefs>
+</ds:datastoreItem>
 </file>
 
-<file path=customXml/itemProps1.xml><?xml version="1.0" encoding="utf-8"?>
+<file path=customXml/itemProps4.xml><?xml version="1.0" encoding="utf-8"?>
 <ds:datastoreItem xmlns:ds="http://schemas.openxmlformats.org/officeDocument/2006/customXml" ds:itemID="{2A684197-0294-4E1E-AEB6-0DCD32234529}">
   <ds:schemaRefs>
     <ds:schemaRef ds:uri="http://schemas.microsoft.com/office/2006/metadata/contentType"/>
@@ -8048,31 +8092,4 @@
     <ds:schemaRef ds:uri="http://schemas.microsoft.com/internal/obd"/>
   </ds:schemaRefs>
 </ds:datastoreItem>
-</file>
-
-<file path=customXml/itemProps2.xml><?xml version="1.0" encoding="utf-8"?>
-<ds:datastoreItem xmlns:ds="http://schemas.openxmlformats.org/officeDocument/2006/customXml" ds:itemID="{CC08FE15-FD71-4071-8E0F-8BE34A00D6BD}">
-  <ds:schemaRefs>
-    <ds:schemaRef ds:uri="http://schemas.microsoft.com/sharepoint/events"/>
-  </ds:schemaRefs>
-</ds:datastoreItem>
-</file>
-
-<file path=customXml/itemProps3.xml><?xml version="1.0" encoding="utf-8"?>
-<ds:datastoreItem xmlns:ds="http://schemas.openxmlformats.org/officeDocument/2006/customXml" ds:itemID="{5D34737E-61E8-4035-A868-C618842E7CF9}">
-  <ds:schemaRefs>
-    <ds:schemaRef ds:uri="http://schemas.microsoft.com/sharepoint/v3/contenttype/forms"/>
-  </ds:schemaRefs>
-</ds:datastoreItem>
-</file>
-
-<file path=customXml/itemProps4.xml><?xml version="1.0" encoding="utf-8"?>
-<ds:datastoreItem xmlns:ds="http://schemas.openxmlformats.org/officeDocument/2006/customXml" ds:itemID="{2D260B71-EADC-4271-AC86-2F194793104C}">
-  <ds:schemaRefs>
-    <ds:schemaRef ds:uri="http://schemas.microsoft.com/office/2006/metadata/properties"/>
-    <ds:schemaRef ds:uri="http://schemas.microsoft.com/office/infopath/2007/PartnerControls"/>
-    <ds:schemaRef ds:uri="dd4118c1-80c0-4fd0-a895-4f8cc7b15db9"/>
-    <ds:schemaRef ds:uri="http://schemas.microsoft.com/sharepoint/v3"/>
-  </ds:schemaRefs>
-</ds:datastoreItem>
 </file>
</xml_diff>